<commit_message>
Update Stavaza ADR2 procedures.pptx
</commit_message>
<xml_diff>
--- a/API/2024-04-25/Stavaza ADR2 procedures.pptx
+++ b/API/2024-04-25/Stavaza ADR2 procedures.pptx
@@ -16071,8 +16071,12 @@
           </a:p>
           <a:p>
             <a:r>
+              <a:rPr lang="en-NL"/>
+              <a:t>Stuurgroep Kennisplatform </a:t>
+            </a:r>
+            <a:r>
               <a:rPr lang="en-NL" dirty="0"/>
-              <a:t>Stuurgroep Kannisplatform APIs is akkoord op 21-09-2024</a:t>
+              <a:t>APIs is akkoord op 21-09-2024</a:t>
             </a:r>
           </a:p>
           <a:p>

</xml_diff>

<commit_message>
update links en opmaak
</commit_message>
<xml_diff>
--- a/API/2024-04-25/Stavaza ADR2 procedures.pptx
+++ b/API/2024-04-25/Stavaza ADR2 procedures.pptx
@@ -15874,8 +15874,58 @@
           <a:p>
             <a:r>
               <a:rPr lang="en-NL" dirty="0"/>
-              <a:t>Beheer Procedures</a:t>
+              <a:t>Beheer Procedure </a:t>
             </a:r>
+            <a:br>
+              <a:rPr lang="en-NL" dirty="0"/>
+            </a:br>
+            <a:r>
+              <a:rPr lang="en-US" b="1" dirty="0" err="1"/>
+              <a:t>NLGov</a:t>
+            </a:r>
+            <a:r>
+              <a:rPr lang="en-US" b="1" dirty="0"/>
+              <a:t> REST API Design Rules 2.0.0</a:t>
+            </a:r>
+          </a:p>
+          <a:p>
+            <a:r>
+              <a:rPr lang="en-US" dirty="0"/>
+              <a:t>https://</a:t>
+            </a:r>
+            <a:r>
+              <a:rPr lang="en-US" dirty="0" err="1"/>
+              <a:t>gitdocumentatie.logius.nl</a:t>
+            </a:r>
+            <a:r>
+              <a:rPr lang="en-US" dirty="0"/>
+              <a:t>/</a:t>
+            </a:r>
+            <a:r>
+              <a:rPr lang="en-US" dirty="0" err="1"/>
+              <a:t>publicatie</a:t>
+            </a:r>
+            <a:r>
+              <a:rPr lang="en-US" dirty="0"/>
+              <a:t>/</a:t>
+            </a:r>
+            <a:r>
+              <a:rPr lang="en-US" dirty="0" err="1"/>
+              <a:t>api</a:t>
+            </a:r>
+            <a:r>
+              <a:rPr lang="en-US" dirty="0"/>
+              <a:t>/</a:t>
+            </a:r>
+            <a:r>
+              <a:rPr lang="en-US" dirty="0" err="1"/>
+              <a:t>adr</a:t>
+            </a:r>
+            <a:r>
+              <a:rPr lang="en-US" dirty="0"/>
+              <a:t>/2.0.0</a:t>
+            </a:r>
+            <a:endParaRPr lang="en-NL" dirty="0"/>
           </a:p>
         </p:txBody>
       </p:sp>
@@ -15953,7 +16003,12 @@
             <p:ph idx="1"/>
           </p:nvPr>
         </p:nvSpPr>
-        <p:spPr/>
+        <p:spPr>
+          <a:xfrm>
+            <a:off x="5118447" y="803186"/>
+            <a:ext cx="6516505" cy="5248622"/>
+          </a:xfrm>
+        </p:spPr>
         <p:txBody>
           <a:bodyPr/>
           <a:lstStyle/>
@@ -16194,7 +16249,12 @@
             <p:ph type="body" idx="1"/>
           </p:nvPr>
         </p:nvSpPr>
-        <p:spPr/>
+        <p:spPr>
+          <a:xfrm>
+            <a:off x="5125137" y="456347"/>
+            <a:ext cx="6265088" cy="685800"/>
+          </a:xfrm>
+        </p:spPr>
         <p:txBody>
           <a:bodyPr/>
           <a:lstStyle/>
@@ -16222,7 +16282,12 @@
             <p:ph sz="half" idx="2"/>
           </p:nvPr>
         </p:nvSpPr>
-        <p:spPr/>
+        <p:spPr>
+          <a:xfrm>
+            <a:off x="5125305" y="1142147"/>
+            <a:ext cx="6264350" cy="1696853"/>
+          </a:xfrm>
+        </p:spPr>
         <p:txBody>
           <a:bodyPr>
             <a:normAutofit/>
@@ -16258,16 +16323,14 @@
           <a:p>
             <a:pPr lvl="1"/>
             <a:r>
-              <a:rPr lang="en-NL" sz="1200" dirty="0"/>
-              <a:t> </a:t>
+              <a:rPr lang="en-US" sz="1200" dirty="0">
+                <a:hlinkClick r:id="rId3"/>
+              </a:rPr>
+              <a:t>https://pgdi.nl/groups/view/fa975d80-05e2-4f9e-89d6-6a053295c97b/programmeringsraad-gdi/files</a:t>
             </a:r>
             <a:r>
-              <a:rPr lang="en-US" sz="1200" b="0" i="0" dirty="0">
-                <a:effectLst/>
-                <a:latin typeface="Helvetica" pitchFamily="2" charset="0"/>
-                <a:hlinkClick r:id="rId3"/>
-              </a:rPr>
-              <a:t>https://pgdi.nl/file/download/e3bd0ba3-a117-42f2-b4e1-d56105b88f96/20240418-pgdi-02-verslagen-voorraadagenda-actie-en-besluitenlijst.pdf</a:t>
+              <a:rPr lang="en-US" sz="1200" dirty="0"/>
+              <a:t> </a:t>
             </a:r>
             <a:endParaRPr lang="en-NL" sz="1200" dirty="0"/>
           </a:p>
@@ -16291,7 +16354,7 @@
         </p:nvSpPr>
         <p:spPr>
           <a:xfrm>
-            <a:off x="5118653" y="3213944"/>
+            <a:off x="5118653" y="2867106"/>
             <a:ext cx="6264414" cy="685800"/>
           </a:xfrm>
         </p:spPr>
@@ -16324,7 +16387,7 @@
         </p:nvSpPr>
         <p:spPr>
           <a:xfrm>
-            <a:off x="5118447" y="3899744"/>
+            <a:off x="5118447" y="3552906"/>
             <a:ext cx="6548036" cy="2460496"/>
           </a:xfrm>
         </p:spPr>
@@ -16467,9 +16530,10 @@
               <a:rPr lang="en-NL" dirty="0"/>
             </a:br>
             <a:r>
-              <a:rPr lang="en-NL" dirty="0"/>
-              <a:t>dd 16-04-2024</a:t>
+              <a:rPr lang="en-NL"/>
+              <a:t>dd 25-04-2024</a:t>
             </a:r>
+            <a:endParaRPr lang="en-NL" dirty="0"/>
           </a:p>
         </p:txBody>
       </p:sp>

</xml_diff>